<commit_message>
updateing for aspnetcore m12 security
</commit_message>
<xml_diff>
--- a/aspnetcore/slides/11_Security.pptx
+++ b/aspnetcore/slides/11_Security.pptx
@@ -5,10 +5,10 @@
     <p:sldMasterId id="2147483772" r:id="rId1"/>
   </p:sldMasterIdLst>
   <p:notesMasterIdLst>
-    <p:notesMasterId r:id="rId15"/>
+    <p:notesMasterId r:id="rId16"/>
   </p:notesMasterIdLst>
   <p:handoutMasterIdLst>
-    <p:handoutMasterId r:id="rId16"/>
+    <p:handoutMasterId r:id="rId17"/>
   </p:handoutMasterIdLst>
   <p:sldIdLst>
     <p:sldId id="327" r:id="rId2"/>
@@ -23,7 +23,8 @@
     <p:sldId id="340" r:id="rId11"/>
     <p:sldId id="341" r:id="rId12"/>
     <p:sldId id="333" r:id="rId13"/>
-    <p:sldId id="334" r:id="rId14"/>
+    <p:sldId id="342" r:id="rId14"/>
+    <p:sldId id="334" r:id="rId15"/>
   </p:sldIdLst>
   <p:sldSz cx="9144000" cy="6858000" type="screen4x3"/>
   <p:notesSz cx="7302500" cy="9588500"/>
@@ -169,6 +170,7 @@
             <p14:sldId id="340"/>
             <p14:sldId id="341"/>
             <p14:sldId id="333"/>
+            <p14:sldId id="342"/>
             <p14:sldId id="334"/>
           </p14:sldIdLst>
         </p14:section>
@@ -297,7 +299,7 @@
               <a:pPr>
                 <a:defRPr/>
               </a:pPr>
-              <a:t>11/5/2018</a:t>
+              <a:t>9/6/2019</a:t>
             </a:fld>
             <a:endParaRPr lang="en-US"/>
           </a:p>
@@ -3352,6 +3354,122 @@
 </file>
 
 <file path=ppt/slides/slide13.xml><?xml version="1.0" encoding="utf-8"?>
+<p:sld xmlns:a="http://schemas.openxmlformats.org/drawingml/2006/main" xmlns:r="http://schemas.openxmlformats.org/officeDocument/2006/relationships" xmlns:p="http://schemas.openxmlformats.org/presentationml/2006/main">
+  <p:cSld>
+    <p:spTree>
+      <p:nvGrpSpPr>
+        <p:cNvPr id="1" name=""/>
+        <p:cNvGrpSpPr/>
+        <p:nvPr/>
+      </p:nvGrpSpPr>
+      <p:grpSpPr>
+        <a:xfrm>
+          <a:off x="0" y="0"/>
+          <a:ext cx="0" cy="0"/>
+          <a:chOff x="0" y="0"/>
+          <a:chExt cx="0" cy="0"/>
+        </a:xfrm>
+      </p:grpSpPr>
+      <p:sp>
+        <p:nvSpPr>
+          <p:cNvPr id="2" name="Title 1">
+            <a:extLst>
+              <a:ext uri="{FF2B5EF4-FFF2-40B4-BE49-F238E27FC236}">
+                <a16:creationId xmlns:a16="http://schemas.microsoft.com/office/drawing/2014/main" id="{6D808743-3706-4DBA-85B9-72E6F96F0A15}"/>
+              </a:ext>
+            </a:extLst>
+          </p:cNvPr>
+          <p:cNvSpPr>
+            <a:spLocks noGrp="1"/>
+          </p:cNvSpPr>
+          <p:nvPr>
+            <p:ph type="title"/>
+          </p:nvPr>
+        </p:nvSpPr>
+        <p:spPr/>
+        <p:txBody>
+          <a:bodyPr/>
+          <a:lstStyle/>
+          <a:p>
+            <a:r>
+              <a:rPr lang="en-US" dirty="0"/>
+              <a:t>Identity Server</a:t>
+            </a:r>
+          </a:p>
+        </p:txBody>
+      </p:sp>
+      <p:sp>
+        <p:nvSpPr>
+          <p:cNvPr id="3" name="Text Placeholder 2">
+            <a:extLst>
+              <a:ext uri="{FF2B5EF4-FFF2-40B4-BE49-F238E27FC236}">
+                <a16:creationId xmlns:a16="http://schemas.microsoft.com/office/drawing/2014/main" id="{16066AB3-C651-4E56-BC3F-03B01C196033}"/>
+              </a:ext>
+            </a:extLst>
+          </p:cNvPr>
+          <p:cNvSpPr>
+            <a:spLocks noGrp="1"/>
+          </p:cNvSpPr>
+          <p:nvPr>
+            <p:ph type="body" idx="1"/>
+          </p:nvPr>
+        </p:nvSpPr>
+        <p:spPr/>
+        <p:txBody>
+          <a:bodyPr/>
+          <a:lstStyle/>
+          <a:p>
+            <a:endParaRPr lang="en-US"/>
+          </a:p>
+        </p:txBody>
+      </p:sp>
+      <p:pic>
+        <p:nvPicPr>
+          <p:cNvPr id="4" name="Picture 3">
+            <a:extLst>
+              <a:ext uri="{FF2B5EF4-FFF2-40B4-BE49-F238E27FC236}">
+                <a16:creationId xmlns:a16="http://schemas.microsoft.com/office/drawing/2014/main" id="{605BB9BB-E701-4BA3-86B3-2911E45F5B39}"/>
+              </a:ext>
+            </a:extLst>
+          </p:cNvPr>
+          <p:cNvPicPr>
+            <a:picLocks noChangeAspect="1"/>
+          </p:cNvPicPr>
+          <p:nvPr/>
+        </p:nvPicPr>
+        <p:blipFill>
+          <a:blip r:embed="rId2"/>
+          <a:stretch>
+            <a:fillRect/>
+          </a:stretch>
+        </p:blipFill>
+        <p:spPr>
+          <a:xfrm>
+            <a:off x="990600" y="2981296"/>
+            <a:ext cx="7552269" cy="1428808"/>
+          </a:xfrm>
+          <a:prstGeom prst="rect">
+            <a:avLst/>
+          </a:prstGeom>
+        </p:spPr>
+      </p:pic>
+    </p:spTree>
+    <p:extLst>
+      <p:ext uri="{BB962C8B-B14F-4D97-AF65-F5344CB8AC3E}">
+        <p14:creationId xmlns:p14="http://schemas.microsoft.com/office/powerpoint/2010/main" val="1876634927"/>
+      </p:ext>
+    </p:extLst>
+  </p:cSld>
+  <p:clrMapOvr>
+    <a:masterClrMapping/>
+  </p:clrMapOvr>
+  <p:transition>
+    <p:fade/>
+  </p:transition>
+</p:sld>
+</file>
+
+<file path=ppt/slides/slide14.xml><?xml version="1.0" encoding="utf-8"?>
 <p:sld xmlns:a="http://schemas.openxmlformats.org/drawingml/2006/main" xmlns:r="http://schemas.openxmlformats.org/officeDocument/2006/relationships" xmlns:p="http://schemas.openxmlformats.org/presentationml/2006/main">
   <p:cSld>
     <p:spTree>

</xml_diff>